<commit_message>
Updating SI figure and folder structure
</commit_message>
<xml_diff>
--- a/Images/SI11.pptx
+++ b/Images/SI11.pptx
@@ -197,7 +197,7 @@
           <a:p>
             <a:fld id="{DC40427D-09B2-479E-BE2F-F1C9B7D308F4}" type="datetimeFigureOut">
               <a:rPr lang="en-US" smtClean="0"/>
-              <a:t>10/25/2021</a:t>
+              <a:t>10/26/2021</a:t>
             </a:fld>
             <a:endParaRPr lang="en-US"/>
           </a:p>
@@ -713,7 +713,7 @@
           <a:p>
             <a:fld id="{B2C42CBD-EDEC-463A-9192-0B8850A40619}" type="datetimeFigureOut">
               <a:rPr lang="en-US" smtClean="0"/>
-              <a:t>10/25/2021</a:t>
+              <a:t>10/26/2021</a:t>
             </a:fld>
             <a:endParaRPr lang="en-US"/>
           </a:p>
@@ -883,7 +883,7 @@
           <a:p>
             <a:fld id="{B2C42CBD-EDEC-463A-9192-0B8850A40619}" type="datetimeFigureOut">
               <a:rPr lang="en-US" smtClean="0"/>
-              <a:t>10/25/2021</a:t>
+              <a:t>10/26/2021</a:t>
             </a:fld>
             <a:endParaRPr lang="en-US"/>
           </a:p>
@@ -1063,7 +1063,7 @@
           <a:p>
             <a:fld id="{B2C42CBD-EDEC-463A-9192-0B8850A40619}" type="datetimeFigureOut">
               <a:rPr lang="en-US" smtClean="0"/>
-              <a:t>10/25/2021</a:t>
+              <a:t>10/26/2021</a:t>
             </a:fld>
             <a:endParaRPr lang="en-US"/>
           </a:p>
@@ -1233,7 +1233,7 @@
           <a:p>
             <a:fld id="{B2C42CBD-EDEC-463A-9192-0B8850A40619}" type="datetimeFigureOut">
               <a:rPr lang="en-US" smtClean="0"/>
-              <a:t>10/25/2021</a:t>
+              <a:t>10/26/2021</a:t>
             </a:fld>
             <a:endParaRPr lang="en-US"/>
           </a:p>
@@ -1477,7 +1477,7 @@
           <a:p>
             <a:fld id="{B2C42CBD-EDEC-463A-9192-0B8850A40619}" type="datetimeFigureOut">
               <a:rPr lang="en-US" smtClean="0"/>
-              <a:t>10/25/2021</a:t>
+              <a:t>10/26/2021</a:t>
             </a:fld>
             <a:endParaRPr lang="en-US"/>
           </a:p>
@@ -1709,7 +1709,7 @@
           <a:p>
             <a:fld id="{B2C42CBD-EDEC-463A-9192-0B8850A40619}" type="datetimeFigureOut">
               <a:rPr lang="en-US" smtClean="0"/>
-              <a:t>10/25/2021</a:t>
+              <a:t>10/26/2021</a:t>
             </a:fld>
             <a:endParaRPr lang="en-US"/>
           </a:p>
@@ -2076,7 +2076,7 @@
           <a:p>
             <a:fld id="{B2C42CBD-EDEC-463A-9192-0B8850A40619}" type="datetimeFigureOut">
               <a:rPr lang="en-US" smtClean="0"/>
-              <a:t>10/25/2021</a:t>
+              <a:t>10/26/2021</a:t>
             </a:fld>
             <a:endParaRPr lang="en-US"/>
           </a:p>
@@ -2194,7 +2194,7 @@
           <a:p>
             <a:fld id="{B2C42CBD-EDEC-463A-9192-0B8850A40619}" type="datetimeFigureOut">
               <a:rPr lang="en-US" smtClean="0"/>
-              <a:t>10/25/2021</a:t>
+              <a:t>10/26/2021</a:t>
             </a:fld>
             <a:endParaRPr lang="en-US"/>
           </a:p>
@@ -2289,7 +2289,7 @@
           <a:p>
             <a:fld id="{B2C42CBD-EDEC-463A-9192-0B8850A40619}" type="datetimeFigureOut">
               <a:rPr lang="en-US" smtClean="0"/>
-              <a:t>10/25/2021</a:t>
+              <a:t>10/26/2021</a:t>
             </a:fld>
             <a:endParaRPr lang="en-US"/>
           </a:p>
@@ -2566,7 +2566,7 @@
           <a:p>
             <a:fld id="{B2C42CBD-EDEC-463A-9192-0B8850A40619}" type="datetimeFigureOut">
               <a:rPr lang="en-US" smtClean="0"/>
-              <a:t>10/25/2021</a:t>
+              <a:t>10/26/2021</a:t>
             </a:fld>
             <a:endParaRPr lang="en-US"/>
           </a:p>
@@ -2823,7 +2823,7 @@
           <a:p>
             <a:fld id="{B2C42CBD-EDEC-463A-9192-0B8850A40619}" type="datetimeFigureOut">
               <a:rPr lang="en-US" smtClean="0"/>
-              <a:t>10/25/2021</a:t>
+              <a:t>10/26/2021</a:t>
             </a:fld>
             <a:endParaRPr lang="en-US"/>
           </a:p>
@@ -3036,7 +3036,7 @@
           <a:p>
             <a:fld id="{B2C42CBD-EDEC-463A-9192-0B8850A40619}" type="datetimeFigureOut">
               <a:rPr lang="en-US" smtClean="0"/>
-              <a:t>10/25/2021</a:t>
+              <a:t>10/26/2021</a:t>
             </a:fld>
             <a:endParaRPr lang="en-US"/>
           </a:p>
@@ -4310,10 +4310,7 @@
               <a:avLst/>
             </a:prstGeom>
             <a:solidFill>
-              <a:schemeClr val="accent6">
-                <a:lumMod val="60000"/>
-                <a:lumOff val="40000"/>
-              </a:schemeClr>
+              <a:srgbClr val="E8718C"/>
             </a:solidFill>
           </p:spPr>
           <p:style>
@@ -4362,10 +4359,7 @@
               <a:avLst/>
             </a:prstGeom>
             <a:solidFill>
-              <a:schemeClr val="accent6">
-                <a:lumMod val="60000"/>
-                <a:lumOff val="40000"/>
-              </a:schemeClr>
+              <a:srgbClr val="E8718C"/>
             </a:solidFill>
           </p:spPr>
           <p:style>
@@ -4389,7 +4383,7 @@
             <a:lstStyle/>
             <a:p>
               <a:pPr algn="ctr"/>
-              <a:endParaRPr lang="en-US" sz="1801"/>
+              <a:endParaRPr lang="en-US" sz="1801" dirty="0"/>
             </a:p>
           </p:txBody>
         </p:sp>
@@ -5100,10 +5094,7 @@
             <a:avLst/>
           </a:prstGeom>
           <a:solidFill>
-            <a:schemeClr val="accent6">
-              <a:lumMod val="60000"/>
-              <a:lumOff val="40000"/>
-            </a:schemeClr>
+            <a:srgbClr val="E8718C"/>
           </a:solidFill>
         </p:spPr>
         <p:style>
@@ -5152,10 +5143,7 @@
             <a:avLst/>
           </a:prstGeom>
           <a:solidFill>
-            <a:schemeClr val="accent6">
-              <a:lumMod val="60000"/>
-              <a:lumOff val="40000"/>
-            </a:schemeClr>
+            <a:srgbClr val="E8718C"/>
           </a:solidFill>
         </p:spPr>
         <p:style>
@@ -5204,10 +5192,7 @@
             <a:avLst/>
           </a:prstGeom>
           <a:solidFill>
-            <a:schemeClr val="accent6">
-              <a:lumMod val="60000"/>
-              <a:lumOff val="40000"/>
-            </a:schemeClr>
+            <a:srgbClr val="E8718C"/>
           </a:solidFill>
         </p:spPr>
         <p:style>
@@ -5473,10 +5458,7 @@
             <a:avLst/>
           </a:prstGeom>
           <a:solidFill>
-            <a:schemeClr val="accent6">
-              <a:lumMod val="60000"/>
-              <a:lumOff val="40000"/>
-            </a:schemeClr>
+            <a:srgbClr val="E8718C"/>
           </a:solidFill>
         </p:spPr>
         <p:style>
@@ -5525,10 +5507,7 @@
             <a:avLst/>
           </a:prstGeom>
           <a:solidFill>
-            <a:schemeClr val="accent6">
-              <a:lumMod val="60000"/>
-              <a:lumOff val="40000"/>
-            </a:schemeClr>
+            <a:srgbClr val="E8718C"/>
           </a:solidFill>
         </p:spPr>
         <p:style>
@@ -5577,10 +5556,7 @@
             <a:avLst/>
           </a:prstGeom>
           <a:solidFill>
-            <a:schemeClr val="accent6">
-              <a:lumMod val="60000"/>
-              <a:lumOff val="40000"/>
-            </a:schemeClr>
+            <a:srgbClr val="E8718C"/>
           </a:solidFill>
         </p:spPr>
         <p:style>
@@ -5847,10 +5823,7 @@
             <a:avLst/>
           </a:prstGeom>
           <a:solidFill>
-            <a:schemeClr val="accent6">
-              <a:lumMod val="60000"/>
-              <a:lumOff val="40000"/>
-            </a:schemeClr>
+            <a:srgbClr val="E8718C"/>
           </a:solidFill>
         </p:spPr>
         <p:style>
@@ -5899,10 +5872,7 @@
             <a:avLst/>
           </a:prstGeom>
           <a:solidFill>
-            <a:schemeClr val="accent6">
-              <a:lumMod val="60000"/>
-              <a:lumOff val="40000"/>
-            </a:schemeClr>
+            <a:srgbClr val="E8718C"/>
           </a:solidFill>
         </p:spPr>
         <p:style>
@@ -5951,10 +5921,7 @@
             <a:avLst/>
           </a:prstGeom>
           <a:solidFill>
-            <a:schemeClr val="accent6">
-              <a:lumMod val="60000"/>
-              <a:lumOff val="40000"/>
-            </a:schemeClr>
+            <a:srgbClr val="E8718C"/>
           </a:solidFill>
         </p:spPr>
         <p:style>
@@ -6101,10 +6068,7 @@
             <a:avLst/>
           </a:prstGeom>
           <a:solidFill>
-            <a:schemeClr val="accent6">
-              <a:lumMod val="60000"/>
-              <a:lumOff val="40000"/>
-            </a:schemeClr>
+            <a:srgbClr val="E8718C"/>
           </a:solidFill>
         </p:spPr>
         <p:style>
@@ -6153,10 +6117,7 @@
             <a:avLst/>
           </a:prstGeom>
           <a:solidFill>
-            <a:schemeClr val="accent6">
-              <a:lumMod val="60000"/>
-              <a:lumOff val="40000"/>
-            </a:schemeClr>
+            <a:srgbClr val="E8718C"/>
           </a:solidFill>
         </p:spPr>
         <p:style>
@@ -6205,10 +6166,7 @@
             <a:avLst/>
           </a:prstGeom>
           <a:solidFill>
-            <a:schemeClr val="accent6">
-              <a:lumMod val="60000"/>
-              <a:lumOff val="40000"/>
-            </a:schemeClr>
+            <a:srgbClr val="E8718C"/>
           </a:solidFill>
         </p:spPr>
         <p:style>
@@ -6457,284 +6415,6 @@
           </a:fontRef>
         </p:style>
       </p:cxnSp>
-      <p:grpSp>
-        <p:nvGrpSpPr>
-          <p:cNvPr id="160" name="Group 159">
-            <a:extLst>
-              <a:ext uri="{FF2B5EF4-FFF2-40B4-BE49-F238E27FC236}">
-                <a16:creationId xmlns:a16="http://schemas.microsoft.com/office/drawing/2014/main" id="{1513EE24-0F49-4E81-A0FF-9C785C4CAF84}"/>
-              </a:ext>
-            </a:extLst>
-          </p:cNvPr>
-          <p:cNvGrpSpPr/>
-          <p:nvPr/>
-        </p:nvGrpSpPr>
-        <p:grpSpPr>
-          <a:xfrm>
-            <a:off x="75340" y="9899645"/>
-            <a:ext cx="3834763" cy="2664267"/>
-            <a:chOff x="704487" y="3736015"/>
-            <a:chExt cx="4225996" cy="2973280"/>
-          </a:xfrm>
-        </p:grpSpPr>
-        <p:pic>
-          <p:nvPicPr>
-            <p:cNvPr id="161" name="Picture 2">
-              <a:extLst>
-                <a:ext uri="{FF2B5EF4-FFF2-40B4-BE49-F238E27FC236}">
-                  <a16:creationId xmlns:a16="http://schemas.microsoft.com/office/drawing/2014/main" id="{B9908BEF-1F04-4A3F-B83C-4371180082E2}"/>
-                </a:ext>
-              </a:extLst>
-            </p:cNvPr>
-            <p:cNvPicPr>
-              <a:picLocks noChangeAspect="1" noChangeArrowheads="1"/>
-            </p:cNvPicPr>
-            <p:nvPr/>
-          </p:nvPicPr>
-          <p:blipFill>
-            <a:blip r:embed="rId6">
-              <a:extLst>
-                <a:ext uri="{28A0092B-C50C-407E-A947-70E740481C1C}">
-                  <a14:useLocalDpi xmlns:a14="http://schemas.microsoft.com/office/drawing/2010/main" val="0"/>
-                </a:ext>
-              </a:extLst>
-            </a:blip>
-            <a:srcRect/>
-            <a:stretch>
-              <a:fillRect/>
-            </a:stretch>
-          </p:blipFill>
-          <p:spPr bwMode="auto">
-            <a:xfrm>
-              <a:off x="765196" y="3736015"/>
-              <a:ext cx="4165287" cy="2862057"/>
-            </a:xfrm>
-            <a:prstGeom prst="rect">
-              <a:avLst/>
-            </a:prstGeom>
-            <a:noFill/>
-            <a:extLst>
-              <a:ext uri="{909E8E84-426E-40DD-AFC4-6F175D3DCCD1}">
-                <a14:hiddenFill xmlns:a14="http://schemas.microsoft.com/office/drawing/2010/main">
-                  <a:solidFill>
-                    <a:srgbClr val="FFFFFF"/>
-                  </a:solidFill>
-                </a14:hiddenFill>
-              </a:ext>
-            </a:extLst>
-          </p:spPr>
-        </p:pic>
-        <p:sp>
-          <p:nvSpPr>
-            <p:cNvPr id="162" name="TextBox 161">
-              <a:extLst>
-                <a:ext uri="{FF2B5EF4-FFF2-40B4-BE49-F238E27FC236}">
-                  <a16:creationId xmlns:a16="http://schemas.microsoft.com/office/drawing/2014/main" id="{A9426960-547B-4F47-94A6-CD915EFD881D}"/>
-                </a:ext>
-              </a:extLst>
-            </p:cNvPr>
-            <p:cNvSpPr txBox="1"/>
-            <p:nvPr/>
-          </p:nvSpPr>
-          <p:spPr>
-            <a:xfrm>
-              <a:off x="2770473" y="6458585"/>
-              <a:ext cx="524503" cy="250710"/>
-            </a:xfrm>
-            <a:prstGeom prst="rect">
-              <a:avLst/>
-            </a:prstGeom>
-            <a:solidFill>
-              <a:schemeClr val="bg1"/>
-            </a:solidFill>
-          </p:spPr>
-          <p:txBody>
-            <a:bodyPr wrap="none" rtlCol="0">
-              <a:spAutoFit/>
-            </a:bodyPr>
-            <a:lstStyle/>
-            <a:p>
-              <a:r>
-                <a:rPr lang="en-US" sz="1029" dirty="0">
-                  <a:latin typeface="Times New Roman" panose="02020603050405020304" pitchFamily="18" charset="0"/>
-                  <a:cs typeface="Times New Roman" panose="02020603050405020304" pitchFamily="18" charset="0"/>
-                </a:rPr>
-                <a:t>log </a:t>
-              </a:r>
-              <a:r>
-                <a:rPr lang="en-US" sz="1029" dirty="0">
-                  <a:latin typeface="Times New Roman" panose="02020603050405020304" pitchFamily="18" charset="0"/>
-                  <a:ea typeface="Calibri" panose="020F0502020204030204" pitchFamily="34" charset="0"/>
-                  <a:cs typeface="Times New Roman" panose="02020603050405020304" pitchFamily="18" charset="0"/>
-                </a:rPr>
-                <a:t>K</a:t>
-              </a:r>
-              <a:r>
-                <a:rPr lang="en-US" sz="1029" baseline="-25000" dirty="0">
-                  <a:latin typeface="Times New Roman" panose="02020603050405020304" pitchFamily="18" charset="0"/>
-                  <a:ea typeface="Calibri" panose="020F0502020204030204" pitchFamily="34" charset="0"/>
-                  <a:cs typeface="Times New Roman" panose="02020603050405020304" pitchFamily="18" charset="0"/>
-                </a:rPr>
-                <a:t>d</a:t>
-              </a:r>
-              <a:endParaRPr lang="en-US" sz="1029" dirty="0">
-                <a:latin typeface="Times New Roman" panose="02020603050405020304" pitchFamily="18" charset="0"/>
-                <a:cs typeface="Times New Roman" panose="02020603050405020304" pitchFamily="18" charset="0"/>
-              </a:endParaRPr>
-            </a:p>
-          </p:txBody>
-        </p:sp>
-        <p:sp>
-          <p:nvSpPr>
-            <p:cNvPr id="163" name="TextBox 162">
-              <a:extLst>
-                <a:ext uri="{FF2B5EF4-FFF2-40B4-BE49-F238E27FC236}">
-                  <a16:creationId xmlns:a16="http://schemas.microsoft.com/office/drawing/2014/main" id="{62834712-DC5D-45F4-A859-378865DEEEA1}"/>
-                </a:ext>
-              </a:extLst>
-            </p:cNvPr>
-            <p:cNvSpPr txBox="1"/>
-            <p:nvPr/>
-          </p:nvSpPr>
-          <p:spPr>
-            <a:xfrm rot="16200000">
-              <a:off x="609269" y="4913629"/>
-              <a:ext cx="441146" cy="250710"/>
-            </a:xfrm>
-            <a:prstGeom prst="rect">
-              <a:avLst/>
-            </a:prstGeom>
-            <a:solidFill>
-              <a:schemeClr val="bg1"/>
-            </a:solidFill>
-          </p:spPr>
-          <p:txBody>
-            <a:bodyPr wrap="none" rtlCol="0">
-              <a:spAutoFit/>
-            </a:bodyPr>
-            <a:lstStyle/>
-            <a:p>
-              <a:r>
-                <a:rPr lang="en-US" sz="1029" dirty="0">
-                  <a:latin typeface="Times New Roman" panose="02020603050405020304" pitchFamily="18" charset="0"/>
-                  <a:cs typeface="Times New Roman" panose="02020603050405020304" pitchFamily="18" charset="0"/>
-                </a:rPr>
-                <a:t>CDF</a:t>
-              </a:r>
-            </a:p>
-          </p:txBody>
-        </p:sp>
-        <p:sp>
-          <p:nvSpPr>
-            <p:cNvPr id="164" name="TextBox 163">
-              <a:extLst>
-                <a:ext uri="{FF2B5EF4-FFF2-40B4-BE49-F238E27FC236}">
-                  <a16:creationId xmlns:a16="http://schemas.microsoft.com/office/drawing/2014/main" id="{A1B38AE2-7C4F-45DE-BA79-B97E12658118}"/>
-                </a:ext>
-              </a:extLst>
-            </p:cNvPr>
-            <p:cNvSpPr txBox="1"/>
-            <p:nvPr/>
-          </p:nvSpPr>
-          <p:spPr>
-            <a:xfrm>
-              <a:off x="3326635" y="6037648"/>
-              <a:ext cx="628698" cy="223972"/>
-            </a:xfrm>
-            <a:prstGeom prst="rect">
-              <a:avLst/>
-            </a:prstGeom>
-            <a:noFill/>
-          </p:spPr>
-          <p:txBody>
-            <a:bodyPr wrap="none" rtlCol="0">
-              <a:spAutoFit/>
-            </a:bodyPr>
-            <a:lstStyle/>
-            <a:p>
-              <a:pPr>
-                <a:lnSpc>
-                  <a:spcPct val="107000"/>
-                </a:lnSpc>
-                <a:spcAft>
-                  <a:spcPts val="1371"/>
-                </a:spcAft>
-              </a:pPr>
-              <a:r>
-                <a:rPr lang="en-US" sz="857" dirty="0">
-                  <a:latin typeface="Times New Roman" panose="02020603050405020304" pitchFamily="18" charset="0"/>
-                  <a:ea typeface="Calibri" panose="020F0502020204030204" pitchFamily="34" charset="0"/>
-                  <a:cs typeface="Times New Roman" panose="02020603050405020304" pitchFamily="18" charset="0"/>
-                </a:rPr>
-                <a:t>Threshold</a:t>
-              </a:r>
-            </a:p>
-          </p:txBody>
-        </p:sp>
-        <p:sp>
-          <p:nvSpPr>
-            <p:cNvPr id="166" name="TextBox 165">
-              <a:extLst>
-                <a:ext uri="{FF2B5EF4-FFF2-40B4-BE49-F238E27FC236}">
-                  <a16:creationId xmlns:a16="http://schemas.microsoft.com/office/drawing/2014/main" id="{F7E78E51-21E4-4A41-ADF5-0021BE26DB10}"/>
-                </a:ext>
-              </a:extLst>
-            </p:cNvPr>
-            <p:cNvSpPr txBox="1"/>
-            <p:nvPr/>
-          </p:nvSpPr>
-          <p:spPr>
-            <a:xfrm>
-              <a:off x="1136554" y="5528676"/>
-              <a:ext cx="668773" cy="223972"/>
-            </a:xfrm>
-            <a:prstGeom prst="rect">
-              <a:avLst/>
-            </a:prstGeom>
-            <a:noFill/>
-          </p:spPr>
-          <p:txBody>
-            <a:bodyPr wrap="none" rtlCol="0">
-              <a:spAutoFit/>
-            </a:bodyPr>
-            <a:lstStyle/>
-            <a:p>
-              <a:pPr>
-                <a:lnSpc>
-                  <a:spcPct val="107000"/>
-                </a:lnSpc>
-                <a:spcAft>
-                  <a:spcPts val="686"/>
-                </a:spcAft>
-              </a:pPr>
-              <a:r>
-                <a:rPr lang="en-US" sz="857" dirty="0">
-                  <a:latin typeface="Times New Roman" panose="02020603050405020304" pitchFamily="18" charset="0"/>
-                  <a:ea typeface="Calibri" panose="020F0502020204030204" pitchFamily="34" charset="0"/>
-                  <a:cs typeface="Times New Roman" panose="02020603050405020304" pitchFamily="18" charset="0"/>
-                </a:rPr>
-                <a:t>p</a:t>
-              </a:r>
-              <a:r>
-                <a:rPr lang="en-US" sz="857" baseline="-25000" dirty="0">
-                  <a:latin typeface="Times New Roman" panose="02020603050405020304" pitchFamily="18" charset="0"/>
-                  <a:ea typeface="Calibri" panose="020F0502020204030204" pitchFamily="34" charset="0"/>
-                  <a:cs typeface="Times New Roman" panose="02020603050405020304" pitchFamily="18" charset="0"/>
-                </a:rPr>
-                <a:t>bind </a:t>
-              </a:r>
-              <a:r>
-                <a:rPr lang="en-US" sz="857" dirty="0">
-                  <a:latin typeface="Times New Roman" panose="02020603050405020304" pitchFamily="18" charset="0"/>
-                  <a:ea typeface="Calibri" panose="020F0502020204030204" pitchFamily="34" charset="0"/>
-                  <a:cs typeface="Times New Roman" panose="02020603050405020304" pitchFamily="18" charset="0"/>
-                </a:rPr>
-                <a:t>= 0.16</a:t>
-              </a:r>
-            </a:p>
-          </p:txBody>
-        </p:sp>
-      </p:grpSp>
       <p:sp>
         <p:nvSpPr>
           <p:cNvPr id="168" name="TextBox 167">
@@ -7663,7 +7343,7 @@
           <p:nvPr/>
         </p:nvPicPr>
         <p:blipFill>
-          <a:blip r:embed="rId7"/>
+          <a:blip r:embed="rId6"/>
           <a:stretch>
             <a:fillRect/>
           </a:stretch>
@@ -7957,6 +7637,350 @@
               <a:latin typeface="Times New Roman" panose="02020603050405020304" pitchFamily="18" charset="0"/>
               <a:cs typeface="Times New Roman" panose="02020603050405020304" pitchFamily="18" charset="0"/>
             </a:endParaRPr>
+          </a:p>
+        </p:txBody>
+      </p:sp>
+      <p:pic>
+        <p:nvPicPr>
+          <p:cNvPr id="2" name="Picture 2">
+            <a:extLst>
+              <a:ext uri="{FF2B5EF4-FFF2-40B4-BE49-F238E27FC236}">
+                <a16:creationId xmlns:a16="http://schemas.microsoft.com/office/drawing/2014/main" id="{66D6F38D-5328-45D7-85AB-4AB7B66127DD}"/>
+              </a:ext>
+            </a:extLst>
+          </p:cNvPr>
+          <p:cNvPicPr>
+            <a:picLocks noChangeAspect="1" noChangeArrowheads="1"/>
+          </p:cNvPicPr>
+          <p:nvPr/>
+        </p:nvPicPr>
+        <p:blipFill>
+          <a:blip r:embed="rId7">
+            <a:extLst>
+              <a:ext uri="{28A0092B-C50C-407E-A947-70E740481C1C}">
+                <a14:useLocalDpi xmlns:a14="http://schemas.microsoft.com/office/drawing/2010/main" val="0"/>
+              </a:ext>
+            </a:extLst>
+          </a:blip>
+          <a:srcRect/>
+          <a:stretch>
+            <a:fillRect/>
+          </a:stretch>
+        </p:blipFill>
+        <p:spPr bwMode="auto">
+          <a:xfrm>
+            <a:off x="379357" y="9933877"/>
+            <a:ext cx="3287194" cy="2460937"/>
+          </a:xfrm>
+          <a:prstGeom prst="rect">
+            <a:avLst/>
+          </a:prstGeom>
+          <a:noFill/>
+          <a:extLst>
+            <a:ext uri="{909E8E84-426E-40DD-AFC4-6F175D3DCCD1}">
+              <a14:hiddenFill xmlns:a14="http://schemas.microsoft.com/office/drawing/2010/main">
+                <a:solidFill>
+                  <a:srgbClr val="FFFFFF"/>
+                </a:solidFill>
+              </a14:hiddenFill>
+            </a:ext>
+          </a:extLst>
+        </p:spPr>
+      </p:pic>
+      <p:sp>
+        <p:nvSpPr>
+          <p:cNvPr id="93" name="TextBox 92">
+            <a:extLst>
+              <a:ext uri="{FF2B5EF4-FFF2-40B4-BE49-F238E27FC236}">
+                <a16:creationId xmlns:a16="http://schemas.microsoft.com/office/drawing/2014/main" id="{050F72F5-4430-414A-9243-B09A520374F4}"/>
+              </a:ext>
+            </a:extLst>
+          </p:cNvPr>
+          <p:cNvSpPr txBox="1"/>
+          <p:nvPr/>
+        </p:nvSpPr>
+        <p:spPr>
+          <a:xfrm>
+            <a:off x="1874849" y="12233857"/>
+            <a:ext cx="475946" cy="224654"/>
+          </a:xfrm>
+          <a:prstGeom prst="rect">
+            <a:avLst/>
+          </a:prstGeom>
+          <a:solidFill>
+            <a:schemeClr val="bg1"/>
+          </a:solidFill>
+        </p:spPr>
+        <p:txBody>
+          <a:bodyPr wrap="none" rtlCol="0">
+            <a:spAutoFit/>
+          </a:bodyPr>
+          <a:lstStyle/>
+          <a:p>
+            <a:r>
+              <a:rPr lang="en-US" sz="1029" dirty="0">
+                <a:latin typeface="Times New Roman" panose="02020603050405020304" pitchFamily="18" charset="0"/>
+                <a:cs typeface="Times New Roman" panose="02020603050405020304" pitchFamily="18" charset="0"/>
+              </a:rPr>
+              <a:t>log </a:t>
+            </a:r>
+            <a:r>
+              <a:rPr lang="en-US" sz="1029" dirty="0">
+                <a:latin typeface="Times New Roman" panose="02020603050405020304" pitchFamily="18" charset="0"/>
+                <a:ea typeface="Calibri" panose="020F0502020204030204" pitchFamily="34" charset="0"/>
+                <a:cs typeface="Times New Roman" panose="02020603050405020304" pitchFamily="18" charset="0"/>
+              </a:rPr>
+              <a:t>K</a:t>
+            </a:r>
+            <a:r>
+              <a:rPr lang="en-US" sz="1029" baseline="-25000" dirty="0">
+                <a:latin typeface="Times New Roman" panose="02020603050405020304" pitchFamily="18" charset="0"/>
+                <a:ea typeface="Calibri" panose="020F0502020204030204" pitchFamily="34" charset="0"/>
+                <a:cs typeface="Times New Roman" panose="02020603050405020304" pitchFamily="18" charset="0"/>
+              </a:rPr>
+              <a:t>d</a:t>
+            </a:r>
+            <a:endParaRPr lang="en-US" sz="1029" dirty="0">
+              <a:latin typeface="Times New Roman" panose="02020603050405020304" pitchFamily="18" charset="0"/>
+              <a:cs typeface="Times New Roman" panose="02020603050405020304" pitchFamily="18" charset="0"/>
+            </a:endParaRPr>
+          </a:p>
+        </p:txBody>
+      </p:sp>
+      <p:sp>
+        <p:nvSpPr>
+          <p:cNvPr id="94" name="TextBox 93">
+            <a:extLst>
+              <a:ext uri="{FF2B5EF4-FFF2-40B4-BE49-F238E27FC236}">
+                <a16:creationId xmlns:a16="http://schemas.microsoft.com/office/drawing/2014/main" id="{C64771CC-6FB1-4076-B022-5A4366C93B5A}"/>
+              </a:ext>
+            </a:extLst>
+          </p:cNvPr>
+          <p:cNvSpPr txBox="1"/>
+          <p:nvPr/>
+        </p:nvSpPr>
+        <p:spPr>
+          <a:xfrm rot="16200000">
+            <a:off x="201079" y="10947577"/>
+            <a:ext cx="395298" cy="227500"/>
+          </a:xfrm>
+          <a:prstGeom prst="rect">
+            <a:avLst/>
+          </a:prstGeom>
+          <a:solidFill>
+            <a:schemeClr val="bg1"/>
+          </a:solidFill>
+        </p:spPr>
+        <p:txBody>
+          <a:bodyPr wrap="none" rtlCol="0">
+            <a:spAutoFit/>
+          </a:bodyPr>
+          <a:lstStyle/>
+          <a:p>
+            <a:r>
+              <a:rPr lang="en-US" sz="1029" dirty="0">
+                <a:latin typeface="Times New Roman" panose="02020603050405020304" pitchFamily="18" charset="0"/>
+                <a:cs typeface="Times New Roman" panose="02020603050405020304" pitchFamily="18" charset="0"/>
+              </a:rPr>
+              <a:t>CDF</a:t>
+            </a:r>
+          </a:p>
+        </p:txBody>
+      </p:sp>
+      <p:sp>
+        <p:nvSpPr>
+          <p:cNvPr id="95" name="TextBox 94">
+            <a:extLst>
+              <a:ext uri="{FF2B5EF4-FFF2-40B4-BE49-F238E27FC236}">
+                <a16:creationId xmlns:a16="http://schemas.microsoft.com/office/drawing/2014/main" id="{AABC376D-E762-4D92-9EA7-D83059BE8ABD}"/>
+              </a:ext>
+            </a:extLst>
+          </p:cNvPr>
+          <p:cNvSpPr txBox="1"/>
+          <p:nvPr/>
+        </p:nvSpPr>
+        <p:spPr>
+          <a:xfrm>
+            <a:off x="1737706" y="11936851"/>
+            <a:ext cx="570495" cy="200695"/>
+          </a:xfrm>
+          <a:prstGeom prst="rect">
+            <a:avLst/>
+          </a:prstGeom>
+          <a:noFill/>
+        </p:spPr>
+        <p:txBody>
+          <a:bodyPr wrap="none" rtlCol="0">
+            <a:spAutoFit/>
+          </a:bodyPr>
+          <a:lstStyle/>
+          <a:p>
+            <a:pPr>
+              <a:lnSpc>
+                <a:spcPct val="107000"/>
+              </a:lnSpc>
+              <a:spcAft>
+                <a:spcPts val="1371"/>
+              </a:spcAft>
+            </a:pPr>
+            <a:r>
+              <a:rPr lang="en-US" sz="857" dirty="0">
+                <a:latin typeface="Times New Roman" panose="02020603050405020304" pitchFamily="18" charset="0"/>
+                <a:ea typeface="Calibri" panose="020F0502020204030204" pitchFamily="34" charset="0"/>
+                <a:cs typeface="Times New Roman" panose="02020603050405020304" pitchFamily="18" charset="0"/>
+              </a:rPr>
+              <a:t>Threshold</a:t>
+            </a:r>
+          </a:p>
+        </p:txBody>
+      </p:sp>
+      <p:sp>
+        <p:nvSpPr>
+          <p:cNvPr id="96" name="TextBox 95">
+            <a:extLst>
+              <a:ext uri="{FF2B5EF4-FFF2-40B4-BE49-F238E27FC236}">
+                <a16:creationId xmlns:a16="http://schemas.microsoft.com/office/drawing/2014/main" id="{382E5042-D0E5-4CDD-99CE-4B5A0553C839}"/>
+              </a:ext>
+            </a:extLst>
+          </p:cNvPr>
+          <p:cNvSpPr txBox="1"/>
+          <p:nvPr/>
+        </p:nvSpPr>
+        <p:spPr>
+          <a:xfrm>
+            <a:off x="651379" y="11479254"/>
+            <a:ext cx="606859" cy="200695"/>
+          </a:xfrm>
+          <a:prstGeom prst="rect">
+            <a:avLst/>
+          </a:prstGeom>
+          <a:noFill/>
+        </p:spPr>
+        <p:txBody>
+          <a:bodyPr wrap="none" rtlCol="0">
+            <a:spAutoFit/>
+          </a:bodyPr>
+          <a:lstStyle/>
+          <a:p>
+            <a:pPr>
+              <a:lnSpc>
+                <a:spcPct val="107000"/>
+              </a:lnSpc>
+              <a:spcAft>
+                <a:spcPts val="686"/>
+              </a:spcAft>
+            </a:pPr>
+            <a:r>
+              <a:rPr lang="en-US" sz="857" dirty="0">
+                <a:latin typeface="Times New Roman" panose="02020603050405020304" pitchFamily="18" charset="0"/>
+                <a:ea typeface="Calibri" panose="020F0502020204030204" pitchFamily="34" charset="0"/>
+                <a:cs typeface="Times New Roman" panose="02020603050405020304" pitchFamily="18" charset="0"/>
+              </a:rPr>
+              <a:t>p</a:t>
+            </a:r>
+            <a:r>
+              <a:rPr lang="en-US" sz="857" baseline="-25000" dirty="0">
+                <a:latin typeface="Times New Roman" panose="02020603050405020304" pitchFamily="18" charset="0"/>
+                <a:ea typeface="Calibri" panose="020F0502020204030204" pitchFamily="34" charset="0"/>
+                <a:cs typeface="Times New Roman" panose="02020603050405020304" pitchFamily="18" charset="0"/>
+              </a:rPr>
+              <a:t>bind </a:t>
+            </a:r>
+            <a:r>
+              <a:rPr lang="en-US" sz="857" dirty="0">
+                <a:latin typeface="Times New Roman" panose="02020603050405020304" pitchFamily="18" charset="0"/>
+                <a:ea typeface="Calibri" panose="020F0502020204030204" pitchFamily="34" charset="0"/>
+                <a:cs typeface="Times New Roman" panose="02020603050405020304" pitchFamily="18" charset="0"/>
+              </a:rPr>
+              <a:t>= 0.16</a:t>
+            </a:r>
+          </a:p>
+        </p:txBody>
+      </p:sp>
+      <p:sp>
+        <p:nvSpPr>
+          <p:cNvPr id="97" name="TextBox 96">
+            <a:extLst>
+              <a:ext uri="{FF2B5EF4-FFF2-40B4-BE49-F238E27FC236}">
+                <a16:creationId xmlns:a16="http://schemas.microsoft.com/office/drawing/2014/main" id="{2ACE3068-CC5E-4568-9B48-03E97434DA34}"/>
+              </a:ext>
+            </a:extLst>
+          </p:cNvPr>
+          <p:cNvSpPr txBox="1"/>
+          <p:nvPr/>
+        </p:nvSpPr>
+        <p:spPr>
+          <a:xfrm>
+            <a:off x="9385335" y="8416053"/>
+            <a:ext cx="1265142" cy="307777"/>
+          </a:xfrm>
+          <a:prstGeom prst="rect">
+            <a:avLst/>
+          </a:prstGeom>
+          <a:noFill/>
+        </p:spPr>
+        <p:txBody>
+          <a:bodyPr wrap="square" rtlCol="0">
+            <a:spAutoFit/>
+          </a:bodyPr>
+          <a:lstStyle/>
+          <a:p>
+            <a:r>
+              <a:rPr lang="en-US" sz="1400" dirty="0">
+                <a:latin typeface="Times New Roman" panose="02020603050405020304" pitchFamily="18" charset="0"/>
+                <a:cs typeface="Times New Roman" panose="02020603050405020304" pitchFamily="18" charset="0"/>
+              </a:rPr>
+              <a:t>Protein target</a:t>
+            </a:r>
+          </a:p>
+        </p:txBody>
+      </p:sp>
+      <p:sp>
+        <p:nvSpPr>
+          <p:cNvPr id="99" name="Oval 98">
+            <a:extLst>
+              <a:ext uri="{FF2B5EF4-FFF2-40B4-BE49-F238E27FC236}">
+                <a16:creationId xmlns:a16="http://schemas.microsoft.com/office/drawing/2014/main" id="{83D4B71A-C8E7-48CC-8343-EE26FE60CE71}"/>
+              </a:ext>
+            </a:extLst>
+          </p:cNvPr>
+          <p:cNvSpPr/>
+          <p:nvPr/>
+        </p:nvSpPr>
+        <p:spPr>
+          <a:xfrm>
+            <a:off x="9166540" y="8443822"/>
+            <a:ext cx="224904" cy="211069"/>
+          </a:xfrm>
+          <a:prstGeom prst="ellipse">
+            <a:avLst/>
+          </a:prstGeom>
+          <a:solidFill>
+            <a:srgbClr val="E8718C"/>
+          </a:solidFill>
+        </p:spPr>
+        <p:style>
+          <a:lnRef idx="2">
+            <a:schemeClr val="accent1">
+              <a:shade val="50000"/>
+            </a:schemeClr>
+          </a:lnRef>
+          <a:fillRef idx="1">
+            <a:schemeClr val="accent1"/>
+          </a:fillRef>
+          <a:effectRef idx="0">
+            <a:schemeClr val="accent1"/>
+          </a:effectRef>
+          <a:fontRef idx="minor">
+            <a:schemeClr val="lt1"/>
+          </a:fontRef>
+        </p:style>
+        <p:txBody>
+          <a:bodyPr rtlCol="0" anchor="ctr"/>
+          <a:lstStyle/>
+          <a:p>
+            <a:pPr algn="ctr"/>
+            <a:endParaRPr lang="en-US" sz="1801" dirty="0"/>
           </a:p>
         </p:txBody>
       </p:sp>

</xml_diff>

<commit_message>
Updating figures, restructuring folders, new auto-docking validation
</commit_message>
<xml_diff>
--- a/Images/SI11.pptx
+++ b/Images/SI11.pptx
@@ -197,7 +197,7 @@
           <a:p>
             <a:fld id="{DC40427D-09B2-479E-BE2F-F1C9B7D308F4}" type="datetimeFigureOut">
               <a:rPr lang="en-US" smtClean="0"/>
-              <a:t>10/30/2021</a:t>
+              <a:t>11/15/2021</a:t>
             </a:fld>
             <a:endParaRPr lang="en-US"/>
           </a:p>
@@ -679,7 +679,7 @@
           <a:p>
             <a:fld id="{B2C42CBD-EDEC-463A-9192-0B8850A40619}" type="datetimeFigureOut">
               <a:rPr lang="en-US" smtClean="0"/>
-              <a:t>10/30/2021</a:t>
+              <a:t>11/15/2021</a:t>
             </a:fld>
             <a:endParaRPr lang="en-US"/>
           </a:p>
@@ -849,7 +849,7 @@
           <a:p>
             <a:fld id="{B2C42CBD-EDEC-463A-9192-0B8850A40619}" type="datetimeFigureOut">
               <a:rPr lang="en-US" smtClean="0"/>
-              <a:t>10/30/2021</a:t>
+              <a:t>11/15/2021</a:t>
             </a:fld>
             <a:endParaRPr lang="en-US"/>
           </a:p>
@@ -1029,7 +1029,7 @@
           <a:p>
             <a:fld id="{B2C42CBD-EDEC-463A-9192-0B8850A40619}" type="datetimeFigureOut">
               <a:rPr lang="en-US" smtClean="0"/>
-              <a:t>10/30/2021</a:t>
+              <a:t>11/15/2021</a:t>
             </a:fld>
             <a:endParaRPr lang="en-US"/>
           </a:p>
@@ -1199,7 +1199,7 @@
           <a:p>
             <a:fld id="{B2C42CBD-EDEC-463A-9192-0B8850A40619}" type="datetimeFigureOut">
               <a:rPr lang="en-US" smtClean="0"/>
-              <a:t>10/30/2021</a:t>
+              <a:t>11/15/2021</a:t>
             </a:fld>
             <a:endParaRPr lang="en-US"/>
           </a:p>
@@ -1443,7 +1443,7 @@
           <a:p>
             <a:fld id="{B2C42CBD-EDEC-463A-9192-0B8850A40619}" type="datetimeFigureOut">
               <a:rPr lang="en-US" smtClean="0"/>
-              <a:t>10/30/2021</a:t>
+              <a:t>11/15/2021</a:t>
             </a:fld>
             <a:endParaRPr lang="en-US"/>
           </a:p>
@@ -1675,7 +1675,7 @@
           <a:p>
             <a:fld id="{B2C42CBD-EDEC-463A-9192-0B8850A40619}" type="datetimeFigureOut">
               <a:rPr lang="en-US" smtClean="0"/>
-              <a:t>10/30/2021</a:t>
+              <a:t>11/15/2021</a:t>
             </a:fld>
             <a:endParaRPr lang="en-US"/>
           </a:p>
@@ -2042,7 +2042,7 @@
           <a:p>
             <a:fld id="{B2C42CBD-EDEC-463A-9192-0B8850A40619}" type="datetimeFigureOut">
               <a:rPr lang="en-US" smtClean="0"/>
-              <a:t>10/30/2021</a:t>
+              <a:t>11/15/2021</a:t>
             </a:fld>
             <a:endParaRPr lang="en-US"/>
           </a:p>
@@ -2160,7 +2160,7 @@
           <a:p>
             <a:fld id="{B2C42CBD-EDEC-463A-9192-0B8850A40619}" type="datetimeFigureOut">
               <a:rPr lang="en-US" smtClean="0"/>
-              <a:t>10/30/2021</a:t>
+              <a:t>11/15/2021</a:t>
             </a:fld>
             <a:endParaRPr lang="en-US"/>
           </a:p>
@@ -2255,7 +2255,7 @@
           <a:p>
             <a:fld id="{B2C42CBD-EDEC-463A-9192-0B8850A40619}" type="datetimeFigureOut">
               <a:rPr lang="en-US" smtClean="0"/>
-              <a:t>10/30/2021</a:t>
+              <a:t>11/15/2021</a:t>
             </a:fld>
             <a:endParaRPr lang="en-US"/>
           </a:p>
@@ -2532,7 +2532,7 @@
           <a:p>
             <a:fld id="{B2C42CBD-EDEC-463A-9192-0B8850A40619}" type="datetimeFigureOut">
               <a:rPr lang="en-US" smtClean="0"/>
-              <a:t>10/30/2021</a:t>
+              <a:t>11/15/2021</a:t>
             </a:fld>
             <a:endParaRPr lang="en-US"/>
           </a:p>
@@ -2789,7 +2789,7 @@
           <a:p>
             <a:fld id="{B2C42CBD-EDEC-463A-9192-0B8850A40619}" type="datetimeFigureOut">
               <a:rPr lang="en-US" smtClean="0"/>
-              <a:t>10/30/2021</a:t>
+              <a:t>11/15/2021</a:t>
             </a:fld>
             <a:endParaRPr lang="en-US"/>
           </a:p>
@@ -3002,7 +3002,7 @@
           <a:p>
             <a:fld id="{B2C42CBD-EDEC-463A-9192-0B8850A40619}" type="datetimeFigureOut">
               <a:rPr lang="en-US" smtClean="0"/>
-              <a:t>10/30/2021</a:t>
+              <a:t>11/15/2021</a:t>
             </a:fld>
             <a:endParaRPr lang="en-US"/>
           </a:p>
@@ -3709,7 +3709,7 @@
         <p:spPr>
           <a:xfrm>
             <a:off x="5161899" y="726517"/>
-            <a:ext cx="1622066" cy="1538883"/>
+            <a:ext cx="1622066" cy="1569660"/>
           </a:xfrm>
           <a:prstGeom prst="rect">
             <a:avLst/>
@@ -3735,10 +3735,21 @@
             <a:pPr algn="ctr"/>
             <a:r>
               <a:rPr lang="el-GR" sz="1200" dirty="0">
-                <a:latin typeface="Times New Roman" panose="02020603050405020304" pitchFamily="18" charset="0"/>
+                <a:effectLst/>
+                <a:latin typeface="Times New Roman" panose="02020603050405020304" pitchFamily="18" charset="0"/>
+                <a:ea typeface="Calibri" panose="020F0502020204030204" pitchFamily="34" charset="0"/>
                 <a:cs typeface="Times New Roman" panose="02020603050405020304" pitchFamily="18" charset="0"/>
               </a:rPr>
               <a:t>γ</a:t>
+            </a:r>
+            <a:r>
+              <a:rPr lang="en-US" sz="1200" baseline="-25000" dirty="0">
+                <a:effectLst/>
+                <a:latin typeface="Times New Roman" panose="02020603050405020304" pitchFamily="18" charset="0"/>
+                <a:ea typeface="Calibri" panose="020F0502020204030204" pitchFamily="34" charset="0"/>
+                <a:cs typeface="Times New Roman" panose="02020603050405020304" pitchFamily="18" charset="0"/>
+              </a:rPr>
+              <a:t>p</a:t>
             </a:r>
             <a:r>
               <a:rPr lang="en-US" sz="1200" dirty="0">
@@ -3755,23 +3766,36 @@
                 <a:effectLst/>
                 <a:latin typeface="Times New Roman" panose="02020603050405020304" pitchFamily="18" charset="0"/>
                 <a:ea typeface="Calibri" panose="020F0502020204030204" pitchFamily="34" charset="0"/>
+                <a:cs typeface="Times New Roman" panose="02020603050405020304" pitchFamily="18" charset="0"/>
               </a:rPr>
               <a:t>k</a:t>
             </a:r>
             <a:r>
               <a:rPr lang="en-US" sz="1200" baseline="-25000" dirty="0">
+                <a:effectLst/>
                 <a:latin typeface="Times New Roman" panose="02020603050405020304" pitchFamily="18" charset="0"/>
                 <a:ea typeface="Calibri" panose="020F0502020204030204" pitchFamily="34" charset="0"/>
-              </a:rPr>
-              <a:t>min</a:t>
+                <a:cs typeface="Times New Roman" panose="02020603050405020304" pitchFamily="18" charset="0"/>
+              </a:rPr>
+              <a:t>p</a:t>
+            </a:r>
+            <a:r>
+              <a:rPr lang="en-US" sz="1200" baseline="30000" dirty="0">
+                <a:effectLst/>
+                <a:latin typeface="Times New Roman" panose="02020603050405020304" pitchFamily="18" charset="0"/>
+                <a:ea typeface="Calibri" panose="020F0502020204030204" pitchFamily="34" charset="0"/>
+                <a:cs typeface="Times New Roman" panose="02020603050405020304" pitchFamily="18" charset="0"/>
+              </a:rPr>
+              <a:t>min </a:t>
             </a:r>
             <a:r>
               <a:rPr lang="en-US" sz="1200" dirty="0">
                 <a:effectLst/>
                 <a:latin typeface="Times New Roman" panose="02020603050405020304" pitchFamily="18" charset="0"/>
                 <a:ea typeface="Calibri" panose="020F0502020204030204" pitchFamily="34" charset="0"/>
-              </a:rPr>
-              <a:t> = 1</a:t>
+                <a:cs typeface="Times New Roman" panose="02020603050405020304" pitchFamily="18" charset="0"/>
+              </a:rPr>
+              <a:t>= 1</a:t>
             </a:r>
             <a:endParaRPr lang="en-US" sz="1200" dirty="0">
               <a:latin typeface="Times New Roman" panose="02020603050405020304" pitchFamily="18" charset="0"/>
@@ -3785,6 +3809,7 @@
                 <a:effectLst/>
                 <a:latin typeface="Times New Roman" panose="02020603050405020304" pitchFamily="18" charset="0"/>
                 <a:ea typeface="Calibri" panose="020F0502020204030204" pitchFamily="34" charset="0"/>
+                <a:cs typeface="Times New Roman" panose="02020603050405020304" pitchFamily="18" charset="0"/>
               </a:rPr>
               <a:t>k</a:t>
             </a:r>
@@ -3793,16 +3818,27 @@
                 <a:effectLst/>
                 <a:latin typeface="Times New Roman" panose="02020603050405020304" pitchFamily="18" charset="0"/>
                 <a:ea typeface="Calibri" panose="020F0502020204030204" pitchFamily="34" charset="0"/>
-              </a:rPr>
-              <a:t>max</a:t>
+                <a:cs typeface="Times New Roman" panose="02020603050405020304" pitchFamily="18" charset="0"/>
+              </a:rPr>
+              <a:t>p</a:t>
+            </a:r>
+            <a:r>
+              <a:rPr lang="en-US" sz="1200" baseline="30000" dirty="0">
+                <a:effectLst/>
+                <a:latin typeface="Times New Roman" panose="02020603050405020304" pitchFamily="18" charset="0"/>
+                <a:ea typeface="Calibri" panose="020F0502020204030204" pitchFamily="34" charset="0"/>
+                <a:cs typeface="Times New Roman" panose="02020603050405020304" pitchFamily="18" charset="0"/>
+              </a:rPr>
+              <a:t>max </a:t>
             </a:r>
             <a:r>
               <a:rPr lang="en-US" sz="1200" dirty="0">
                 <a:effectLst/>
                 <a:latin typeface="Times New Roman" panose="02020603050405020304" pitchFamily="18" charset="0"/>
                 <a:ea typeface="Calibri" panose="020F0502020204030204" pitchFamily="34" charset="0"/>
-              </a:rPr>
-              <a:t> = 1,426</a:t>
+                <a:cs typeface="Times New Roman" panose="02020603050405020304" pitchFamily="18" charset="0"/>
+              </a:rPr>
+              <a:t>= 1,426</a:t>
             </a:r>
             <a:endParaRPr lang="en-US" sz="1200" dirty="0">
               <a:latin typeface="Times New Roman" panose="02020603050405020304" pitchFamily="18" charset="0"/>
@@ -3811,7 +3847,10 @@
           </a:p>
           <a:p>
             <a:pPr algn="ctr"/>
-            <a:endParaRPr lang="en-US" sz="1000" dirty="0"/>
+            <a:endParaRPr lang="en-US" sz="1200" dirty="0">
+              <a:latin typeface="Times New Roman" panose="02020603050405020304" pitchFamily="18" charset="0"/>
+              <a:cs typeface="Times New Roman" panose="02020603050405020304" pitchFamily="18" charset="0"/>
+            </a:endParaRPr>
           </a:p>
           <a:p>
             <a:pPr algn="ctr"/>
@@ -3966,7 +4005,39 @@
                 <a:latin typeface="Times New Roman" panose="02020603050405020304" pitchFamily="18" charset="0"/>
                 <a:cs typeface="Times New Roman" panose="02020603050405020304" pitchFamily="18" charset="0"/>
               </a:rPr>
-              <a:t> &lt;k&gt;=47</a:t>
+              <a:t> &lt;</a:t>
+            </a:r>
+            <a:r>
+              <a:rPr lang="en-US" sz="1200">
+                <a:effectLst/>
+                <a:latin typeface="Times New Roman" panose="02020603050405020304" pitchFamily="18" charset="0"/>
+                <a:ea typeface="Calibri" panose="020F0502020204030204" pitchFamily="34" charset="0"/>
+                <a:cs typeface="Times New Roman" panose="02020603050405020304" pitchFamily="18" charset="0"/>
+              </a:rPr>
+              <a:t>k</a:t>
+            </a:r>
+            <a:r>
+              <a:rPr lang="en-US" sz="1200" baseline="-25000">
+                <a:effectLst/>
+                <a:latin typeface="Times New Roman" panose="02020603050405020304" pitchFamily="18" charset="0"/>
+                <a:ea typeface="Calibri" panose="020F0502020204030204" pitchFamily="34" charset="0"/>
+                <a:cs typeface="Times New Roman" panose="02020603050405020304" pitchFamily="18" charset="0"/>
+              </a:rPr>
+              <a:t>p</a:t>
+            </a:r>
+            <a:r>
+              <a:rPr lang="en-US" sz="1200">
+                <a:latin typeface="Times New Roman" panose="02020603050405020304" pitchFamily="18" charset="0"/>
+                <a:cs typeface="Times New Roman" panose="02020603050405020304" pitchFamily="18" charset="0"/>
+              </a:rPr>
+              <a:t>&gt;=</a:t>
+            </a:r>
+            <a:r>
+              <a:rPr lang="en-US" sz="1200" dirty="0">
+                <a:latin typeface="Times New Roman" panose="02020603050405020304" pitchFamily="18" charset="0"/>
+                <a:cs typeface="Times New Roman" panose="02020603050405020304" pitchFamily="18" charset="0"/>
+              </a:rPr>
+              <a:t>47</a:t>
             </a:r>
           </a:p>
         </p:txBody>

</xml_diff>